<commit_message>
FEAT: commit before applying tripleQ_dwn
</commit_message>
<xml_diff>
--- a/Report_solLatt.pptx
+++ b/Report_solLatt.pptx
@@ -10,6 +10,10 @@
     <p:sldId id="258" r:id="rId9"/>
     <p:sldId id="259" r:id="rId10"/>
     <p:sldId id="260" r:id="rId11"/>
+    <p:sldId id="261" r:id="rId12"/>
+    <p:sldId id="262" r:id="rId13"/>
+    <p:sldId id="263" r:id="rId14"/>
+    <p:sldId id="264" r:id="rId15"/>
   </p:sldIdLst>
   <p:sldSz cx="7562088" cy="10689336" type="screen4x3"/>
   <p:notesSz cx="6858000" cy="9144000"/>
@@ -3199,7 +3203,7 @@
       <p:grpSpPr/>
       <p:pic>
         <p:nvPicPr>
-          <p:cNvPr id="2" name="Picture 1" descr="data_fig_1.png"/>
+          <p:cNvPr id="2" name="Picture 1" descr="data_fig_1_0.png"/>
           <p:cNvPicPr>
             <a:picLocks noChangeAspect="1"/>
           </p:cNvPicPr>
@@ -3324,7 +3328,132 @@
       <p:grpSpPr/>
       <p:pic>
         <p:nvPicPr>
-          <p:cNvPr id="2" name="Picture 1" descr="data_fig_2.png"/>
+          <p:cNvPr id="2" name="Picture 1" descr="data_fig_1_1.png"/>
+          <p:cNvPicPr>
+            <a:picLocks noChangeAspect="1"/>
+          </p:cNvPicPr>
+          <p:nvPr/>
+        </p:nvPicPr>
+        <p:blipFill>
+          <a:blip r:embed="rId2"/>
+          <a:stretch>
+            <a:fillRect/>
+          </a:stretch>
+        </p:blipFill>
+        <p:spPr>
+          <a:xfrm>
+            <a:off x="457200" y="914400"/>
+            <a:ext cx="3096000" cy="2504118"/>
+          </a:xfrm>
+          <a:prstGeom prst="rect">
+            <a:avLst/>
+          </a:prstGeom>
+        </p:spPr>
+      </p:pic>
+      <p:sp>
+        <p:nvSpPr>
+          <p:cNvPr id="3" name="TextBox 2"/>
+          <p:cNvSpPr txBox="1"/>
+          <p:nvPr/>
+        </p:nvSpPr>
+        <p:spPr>
+          <a:xfrm>
+            <a:off x="457200" y="7289280"/>
+            <a:ext cx="6647688" cy="9144000"/>
+          </a:xfrm>
+          <a:prstGeom prst="rect">
+            <a:avLst/>
+          </a:prstGeom>
+          <a:noFill/>
+        </p:spPr>
+        <p:txBody>
+          <a:bodyPr wrap="none">
+            <a:spAutoFit/>
+          </a:bodyPr>
+          <a:lstStyle/>
+          <a:p>
+            <a:pPr>
+              <a:defRPr b="1" sz="1400"/>
+            </a:pPr>
+            <a:r>
+              <a:t>Figure 1: 3x3 Charge Density Wave (CDW) in 2H-TaSe2</a:t>
+            </a:r>
+          </a:p>
+          <a:p>
+            <a:pPr>
+              <a:defRPr b="1" sz="1100"/>
+            </a:pPr>
+            <a:r>
+              <a:t>Info:</a:t>
+            </a:r>
+          </a:p>
+          <a:p>
+            <a:pPr lvl="1"/>
+            <a:r>
+              <a:t>Lattice structure</a:t>
+            </a:r>
+          </a:p>
+          <a:p>
+            <a:pPr lvl="1"/>
+            <a:r>
+              <a:t>CDW in real space</a:t>
+            </a:r>
+          </a:p>
+          <a:p>
+            <a:pPr lvl="1"/>
+            <a:r>
+              <a:t>FFT of Topo</a:t>
+            </a:r>
+          </a:p>
+          <a:p>
+            <a:pPr>
+              <a:defRPr b="1" sz="1100"/>
+            </a:pPr>
+            <a:r>
+              <a:t>Argument:</a:t>
+            </a:r>
+          </a:p>
+          <a:p>
+            <a:pPr lvl="1"/>
+            <a:r>
+              <a:t>atom(Se) and CDW both corrugation are observed</a:t>
+            </a:r>
+          </a:p>
+          <a:p>
+            <a:pPr lvl="1"/>
+            <a:r>
+              <a:t>CDW center is hollow</a:t>
+            </a:r>
+          </a:p>
+          <a:p>
+            <a:pPr lvl="1"/>
+            <a:r>
+              <a:t>3x3 CDW from FFT</a:t>
+            </a:r>
+          </a:p>
+        </p:txBody>
+      </p:sp>
+    </p:spTree>
+  </p:cSld>
+  <p:clrMapOvr>
+    <a:masterClrMapping/>
+  </p:clrMapOvr>
+</p:sld>
+</file>
+
+<file path=ppt/slides/slide4.xml><?xml version="1.0" encoding="utf-8"?>
+<p:sld xmlns:a="http://schemas.openxmlformats.org/drawingml/2006/main" xmlns:p="http://schemas.openxmlformats.org/presentationml/2006/main" xmlns:r="http://schemas.openxmlformats.org/officeDocument/2006/relationships">
+  <p:cSld>
+    <p:spTree>
+      <p:nvGrpSpPr>
+        <p:cNvPr id="1" name=""/>
+        <p:cNvGrpSpPr/>
+        <p:nvPr/>
+      </p:nvGrpSpPr>
+      <p:grpSpPr/>
+      <p:pic>
+        <p:nvPicPr>
+          <p:cNvPr id="2" name="Picture 1" descr="data_fig_2_0.png"/>
           <p:cNvPicPr>
             <a:picLocks noChangeAspect="1"/>
           </p:cNvPicPr>
@@ -3437,7 +3566,7 @@
 </p:sld>
 </file>
 
-<file path=ppt/slides/slide4.xml><?xml version="1.0" encoding="utf-8"?>
+<file path=ppt/slides/slide5.xml><?xml version="1.0" encoding="utf-8"?>
 <p:sld xmlns:a="http://schemas.openxmlformats.org/drawingml/2006/main" xmlns:p="http://schemas.openxmlformats.org/presentationml/2006/main" xmlns:r="http://schemas.openxmlformats.org/officeDocument/2006/relationships">
   <p:cSld>
     <p:spTree>
@@ -3449,7 +3578,132 @@
       <p:grpSpPr/>
       <p:pic>
         <p:nvPicPr>
-          <p:cNvPr id="2" name="Picture 1" descr="data_fig_3.png"/>
+          <p:cNvPr id="2" name="Picture 1" descr="data_fig_2_1.png"/>
+          <p:cNvPicPr>
+            <a:picLocks noChangeAspect="1"/>
+          </p:cNvPicPr>
+          <p:nvPr/>
+        </p:nvPicPr>
+        <p:blipFill>
+          <a:blip r:embed="rId2"/>
+          <a:stretch>
+            <a:fillRect/>
+          </a:stretch>
+        </p:blipFill>
+        <p:spPr>
+          <a:xfrm>
+            <a:off x="577044" y="914400"/>
+            <a:ext cx="6408000" cy="3891574"/>
+          </a:xfrm>
+          <a:prstGeom prst="rect">
+            <a:avLst/>
+          </a:prstGeom>
+        </p:spPr>
+      </p:pic>
+      <p:sp>
+        <p:nvSpPr>
+          <p:cNvPr id="3" name="TextBox 2"/>
+          <p:cNvSpPr txBox="1"/>
+          <p:nvPr/>
+        </p:nvSpPr>
+        <p:spPr>
+          <a:xfrm>
+            <a:off x="457200" y="7505280"/>
+            <a:ext cx="6647688" cy="3657600"/>
+          </a:xfrm>
+          <a:prstGeom prst="rect">
+            <a:avLst/>
+          </a:prstGeom>
+          <a:noFill/>
+        </p:spPr>
+        <p:txBody>
+          <a:bodyPr wrap="none">
+            <a:spAutoFit/>
+          </a:bodyPr>
+          <a:lstStyle/>
+          <a:p>
+            <a:pPr>
+              <a:defRPr b="1" sz="1400"/>
+            </a:pPr>
+            <a:r>
+              <a:t>Figure 2: 3 types of topological domain walls (DW)</a:t>
+            </a:r>
+          </a:p>
+          <a:p>
+            <a:pPr>
+              <a:defRPr b="1" sz="1100"/>
+            </a:pPr>
+            <a:r>
+              <a:t>Info:</a:t>
+            </a:r>
+          </a:p>
+          <a:p>
+            <a:pPr lvl="1"/>
+            <a:r>
+              <a:t>three DWs topo</a:t>
+            </a:r>
+          </a:p>
+          <a:p>
+            <a:pPr lvl="1"/>
+            <a:r>
+              <a:t>three DWs cartoon</a:t>
+            </a:r>
+          </a:p>
+          <a:p>
+            <a:pPr lvl="1"/>
+            <a:r>
+              <a:t>phaseshiftmap of DWN</a:t>
+            </a:r>
+          </a:p>
+          <a:p>
+            <a:pPr>
+              <a:defRPr b="1" sz="1100"/>
+            </a:pPr>
+            <a:r>
+              <a:t>Argument:</a:t>
+            </a:r>
+          </a:p>
+          <a:p>
+            <a:pPr lvl="1"/>
+            <a:r>
+              <a:t>atom corruation is fixed but CDW currgation localy shift</a:t>
+            </a:r>
+          </a:p>
+          <a:p>
+            <a:pPr lvl="1"/>
+            <a:r>
+              <a:t>three shift rgb has a b^3=g^3=r^3=rgb=0</a:t>
+            </a:r>
+          </a:p>
+          <a:p>
+            <a:pPr lvl="1"/>
+            <a:r>
+              <a:t>shiftmap shows honeycomb-like DWN</a:t>
+            </a:r>
+          </a:p>
+        </p:txBody>
+      </p:sp>
+    </p:spTree>
+  </p:cSld>
+  <p:clrMapOvr>
+    <a:masterClrMapping/>
+  </p:clrMapOvr>
+</p:sld>
+</file>
+
+<file path=ppt/slides/slide6.xml><?xml version="1.0" encoding="utf-8"?>
+<p:sld xmlns:a="http://schemas.openxmlformats.org/drawingml/2006/main" xmlns:p="http://schemas.openxmlformats.org/presentationml/2006/main" xmlns:r="http://schemas.openxmlformats.org/officeDocument/2006/relationships">
+  <p:cSld>
+    <p:spTree>
+      <p:nvGrpSpPr>
+        <p:cNvPr id="1" name=""/>
+        <p:cNvGrpSpPr/>
+        <p:nvPr/>
+      </p:nvGrpSpPr>
+      <p:grpSpPr/>
+      <p:pic>
+        <p:nvPicPr>
+          <p:cNvPr id="2" name="Picture 1" descr="data_fig_3_0.png"/>
           <p:cNvPicPr>
             <a:picLocks noChangeAspect="1"/>
           </p:cNvPicPr>
@@ -3562,7 +3816,7 @@
 </p:sld>
 </file>
 
-<file path=ppt/slides/slide5.xml><?xml version="1.0" encoding="utf-8"?>
+<file path=ppt/slides/slide7.xml><?xml version="1.0" encoding="utf-8"?>
 <p:sld xmlns:a="http://schemas.openxmlformats.org/drawingml/2006/main" xmlns:p="http://schemas.openxmlformats.org/presentationml/2006/main" xmlns:r="http://schemas.openxmlformats.org/officeDocument/2006/relationships">
   <p:cSld>
     <p:spTree>
@@ -3574,7 +3828,257 @@
       <p:grpSpPr/>
       <p:pic>
         <p:nvPicPr>
-          <p:cNvPr id="2" name="Picture 1" descr="data_fig_4.png"/>
+          <p:cNvPr id="2" name="Picture 1" descr="data_fig_3_0.png"/>
+          <p:cNvPicPr>
+            <a:picLocks noChangeAspect="1"/>
+          </p:cNvPicPr>
+          <p:nvPr/>
+        </p:nvPicPr>
+        <p:blipFill>
+          <a:blip r:embed="rId2"/>
+          <a:stretch>
+            <a:fillRect/>
+          </a:stretch>
+        </p:blipFill>
+        <p:spPr>
+          <a:xfrm>
+            <a:off x="577044" y="914400"/>
+            <a:ext cx="6408000" cy="3255451"/>
+          </a:xfrm>
+          <a:prstGeom prst="rect">
+            <a:avLst/>
+          </a:prstGeom>
+        </p:spPr>
+      </p:pic>
+      <p:sp>
+        <p:nvSpPr>
+          <p:cNvPr id="3" name="TextBox 2"/>
+          <p:cNvSpPr txBox="1"/>
+          <p:nvPr/>
+        </p:nvSpPr>
+        <p:spPr>
+          <a:xfrm>
+            <a:off x="457200" y="7505280"/>
+            <a:ext cx="6647688" cy="3657600"/>
+          </a:xfrm>
+          <a:prstGeom prst="rect">
+            <a:avLst/>
+          </a:prstGeom>
+          <a:noFill/>
+        </p:spPr>
+        <p:txBody>
+          <a:bodyPr wrap="none">
+            <a:spAutoFit/>
+          </a:bodyPr>
+          <a:lstStyle/>
+          <a:p>
+            <a:pPr>
+              <a:defRPr b="1" sz="1400"/>
+            </a:pPr>
+            <a:r>
+              <a:t>Figure 3: two types of chiral vortices (R and L)</a:t>
+            </a:r>
+          </a:p>
+          <a:p>
+            <a:pPr>
+              <a:defRPr b="1" sz="1100"/>
+            </a:pPr>
+            <a:r>
+              <a:t>Info:</a:t>
+            </a:r>
+          </a:p>
+          <a:p>
+            <a:pPr lvl="1"/>
+            <a:r>
+              <a:t>schematic of DV</a:t>
+            </a:r>
+          </a:p>
+          <a:p>
+            <a:pPr lvl="1"/>
+            <a:r>
+              <a:t>phase infos of DV</a:t>
+            </a:r>
+          </a:p>
+          <a:p>
+            <a:pPr lvl="1"/>
+            <a:r>
+              <a:t>tinker toy model of DV</a:t>
+            </a:r>
+          </a:p>
+          <a:p>
+            <a:pPr>
+              <a:defRPr b="1" sz="1100"/>
+            </a:pPr>
+            <a:r>
+              <a:t>Argument:</a:t>
+            </a:r>
+          </a:p>
+          <a:p>
+            <a:pPr lvl="1"/>
+            <a:r>
+              <a:t>tri-junction of 3 differnet phase</a:t>
+            </a:r>
+          </a:p>
+          <a:p>
+            <a:pPr lvl="1"/>
+            <a:r>
+              <a:t>Identified by not only shift but also centerness</a:t>
+            </a:r>
+          </a:p>
+          <a:p>
+            <a:pPr lvl="1"/>
+            <a:r>
+              <a:t>honeycomb structure is naturally formed by the existence of R,L vortex</a:t>
+            </a:r>
+          </a:p>
+        </p:txBody>
+      </p:sp>
+    </p:spTree>
+  </p:cSld>
+  <p:clrMapOvr>
+    <a:masterClrMapping/>
+  </p:clrMapOvr>
+</p:sld>
+</file>
+
+<file path=ppt/slides/slide8.xml><?xml version="1.0" encoding="utf-8"?>
+<p:sld xmlns:a="http://schemas.openxmlformats.org/drawingml/2006/main" xmlns:p="http://schemas.openxmlformats.org/presentationml/2006/main" xmlns:r="http://schemas.openxmlformats.org/officeDocument/2006/relationships">
+  <p:cSld>
+    <p:spTree>
+      <p:nvGrpSpPr>
+        <p:cNvPr id="1" name=""/>
+        <p:cNvGrpSpPr/>
+        <p:nvPr/>
+      </p:nvGrpSpPr>
+      <p:grpSpPr/>
+      <p:pic>
+        <p:nvPicPr>
+          <p:cNvPr id="2" name="Picture 1" descr="data_fig_4_0.png"/>
+          <p:cNvPicPr>
+            <a:picLocks noChangeAspect="1"/>
+          </p:cNvPicPr>
+          <p:nvPr/>
+        </p:nvPicPr>
+        <p:blipFill>
+          <a:blip r:embed="rId2"/>
+          <a:stretch>
+            <a:fillRect/>
+          </a:stretch>
+        </p:blipFill>
+        <p:spPr>
+          <a:xfrm>
+            <a:off x="457200" y="914400"/>
+            <a:ext cx="3096000" cy="4752778"/>
+          </a:xfrm>
+          <a:prstGeom prst="rect">
+            <a:avLst/>
+          </a:prstGeom>
+        </p:spPr>
+      </p:pic>
+      <p:sp>
+        <p:nvSpPr>
+          <p:cNvPr id="3" name="TextBox 2"/>
+          <p:cNvSpPr txBox="1"/>
+          <p:nvPr/>
+        </p:nvSpPr>
+        <p:spPr>
+          <a:xfrm>
+            <a:off x="457200" y="7289280"/>
+            <a:ext cx="6647688" cy="9144000"/>
+          </a:xfrm>
+          <a:prstGeom prst="rect">
+            <a:avLst/>
+          </a:prstGeom>
+          <a:noFill/>
+        </p:spPr>
+        <p:txBody>
+          <a:bodyPr wrap="none">
+            <a:spAutoFit/>
+          </a:bodyPr>
+          <a:lstStyle/>
+          <a:p>
+            <a:pPr>
+              <a:defRPr b="1" sz="1400"/>
+            </a:pPr>
+            <a:r>
+              <a:t>Figure 4: Phase Pinning at the Domain Walls</a:t>
+            </a:r>
+          </a:p>
+          <a:p>
+            <a:pPr>
+              <a:defRPr b="1" sz="1100"/>
+            </a:pPr>
+            <a:r>
+              <a:t>Info:</a:t>
+            </a:r>
+          </a:p>
+          <a:p>
+            <a:pPr lvl="1"/>
+            <a:r>
+              <a:t>DWN topological encoded</a:t>
+            </a:r>
+          </a:p>
+          <a:p>
+            <a:pPr lvl="1"/>
+            <a:r>
+              <a:t>geometric diagram</a:t>
+            </a:r>
+          </a:p>
+          <a:p>
+            <a:pPr lvl="1"/>
+            <a:r>
+              <a:t>algebraic diagram</a:t>
+            </a:r>
+          </a:p>
+          <a:p>
+            <a:pPr>
+              <a:defRPr b="1" sz="1100"/>
+            </a:pPr>
+            <a:r>
+              <a:t>Argument:</a:t>
+            </a:r>
+          </a:p>
+          <a:p>
+            <a:pPr lvl="1"/>
+            <a:r>
+              <a:t>Bulk-boundary correspendence(Uniqueness of boundary decomposition)</a:t>
+            </a:r>
+          </a:p>
+          <a:p>
+            <a:pPr lvl="1"/>
+            <a:r>
+              <a:t>charge calculation from bounding loops</a:t>
+            </a:r>
+          </a:p>
+          <a:p>
+            <a:pPr lvl="1"/>
+            <a:r>
+              <a:t>Topological invariant is rigorously defined by group</a:t>
+            </a:r>
+          </a:p>
+        </p:txBody>
+      </p:sp>
+    </p:spTree>
+  </p:cSld>
+  <p:clrMapOvr>
+    <a:masterClrMapping/>
+  </p:clrMapOvr>
+</p:sld>
+</file>
+
+<file path=ppt/slides/slide9.xml><?xml version="1.0" encoding="utf-8"?>
+<p:sld xmlns:a="http://schemas.openxmlformats.org/drawingml/2006/main" xmlns:p="http://schemas.openxmlformats.org/presentationml/2006/main" xmlns:r="http://schemas.openxmlformats.org/officeDocument/2006/relationships">
+  <p:cSld>
+    <p:spTree>
+      <p:nvGrpSpPr>
+        <p:cNvPr id="1" name=""/>
+        <p:cNvGrpSpPr/>
+        <p:nvPr/>
+      </p:nvGrpSpPr>
+      <p:grpSpPr/>
+      <p:pic>
+        <p:nvPicPr>
+          <p:cNvPr id="2" name="Picture 1" descr="data_fig_4_0.png"/>
           <p:cNvPicPr>
             <a:picLocks noChangeAspect="1"/>
           </p:cNvPicPr>

</xml_diff>

<commit_message>
FEAT: commit after finishing 1st proposal
</commit_message>
<xml_diff>
--- a/Report_solLatt.pptx
+++ b/Report_solLatt.pptx
@@ -5,17 +5,17 @@
     <p:sldMasterId id="2147483648" r:id="rId1"/>
   </p:sldMasterIdLst>
   <p:sldIdLst>
-    <p:sldId id="256" r:id="rId7"/>
-    <p:sldId id="257" r:id="rId8"/>
-    <p:sldId id="258" r:id="rId9"/>
-    <p:sldId id="259" r:id="rId10"/>
-    <p:sldId id="260" r:id="rId11"/>
-    <p:sldId id="261" r:id="rId12"/>
-    <p:sldId id="262" r:id="rId13"/>
-    <p:sldId id="263" r:id="rId14"/>
-    <p:sldId id="264" r:id="rId15"/>
+    <p:sldId id="256" r:id="rId2"/>
+    <p:sldId id="257" r:id="rId3"/>
+    <p:sldId id="258" r:id="rId4"/>
+    <p:sldId id="259" r:id="rId5"/>
+    <p:sldId id="260" r:id="rId6"/>
+    <p:sldId id="261" r:id="rId7"/>
+    <p:sldId id="262" r:id="rId8"/>
+    <p:sldId id="263" r:id="rId9"/>
+    <p:sldId id="264" r:id="rId10"/>
   </p:sldIdLst>
-  <p:sldSz cx="7562088" cy="10689336" type="screen4x3"/>
+  <p:sldSz cx="7562850" cy="10688638"/>
   <p:notesSz cx="6858000" cy="9144000"/>
   <p:defaultTextStyle>
     <a:defPPr>
@@ -112,6 +112,22 @@
       </a:defRPr>
     </a:lvl9pPr>
   </p:defaultTextStyle>
+  <p:extLst>
+    <p:ext uri="{EFAFB233-063F-42B5-8137-9DF3F51BA10A}">
+      <p15:sldGuideLst xmlns:p15="http://schemas.microsoft.com/office/powerpoint/2012/main">
+        <p15:guide id="1" orient="horz" pos="2160">
+          <p15:clr>
+            <a:srgbClr val="A4A3A4"/>
+          </p15:clr>
+        </p15:guide>
+        <p15:guide id="2" pos="2880">
+          <p15:clr>
+            <a:srgbClr val="A4A3A4"/>
+          </p15:clr>
+        </p15:guide>
+      </p15:sldGuideLst>
+    </p:ext>
+  </p:extLst>
 </p:presentation>
 </file>
 
@@ -153,10 +169,9 @@
           <a:lstStyle/>
           <a:p>
             <a:r>
-              <a:rPr lang="en-US" smtClean="0"/>
+              <a:rPr lang="en-US"/>
               <a:t>Click to edit Master title style</a:t>
             </a:r>
-            <a:endParaRPr lang="en-US"/>
           </a:p>
         </p:txBody>
       </p:sp>
@@ -272,10 +287,9 @@
           </a:lstStyle>
           <a:p>
             <a:r>
-              <a:rPr lang="en-US" smtClean="0"/>
+              <a:rPr lang="en-US"/>
               <a:t>Click to edit Master subtitle style</a:t>
             </a:r>
-            <a:endParaRPr lang="en-US"/>
           </a:p>
         </p:txBody>
       </p:sp>
@@ -296,7 +310,7 @@
           <a:p>
             <a:fld id="{5BCAD085-E8A6-8845-BD4E-CB4CCA059FC4}" type="datetimeFigureOut">
               <a:rPr lang="en-US" smtClean="0"/>
-              <a:t>1/27/13</a:t>
+              <a:t>11/24/2025</a:t>
             </a:fld>
             <a:endParaRPr lang="en-US"/>
           </a:p>
@@ -390,10 +404,9 @@
           <a:lstStyle/>
           <a:p>
             <a:r>
-              <a:rPr lang="en-US" smtClean="0"/>
+              <a:rPr lang="en-US"/>
               <a:t>Click to edit Master title style</a:t>
             </a:r>
-            <a:endParaRPr lang="en-US"/>
           </a:p>
         </p:txBody>
       </p:sp>
@@ -414,38 +427,37 @@
           <a:p>
             <a:pPr lvl="0"/>
             <a:r>
-              <a:rPr lang="en-US" smtClean="0"/>
+              <a:rPr lang="en-US"/>
               <a:t>Click to edit Master text styles</a:t>
             </a:r>
           </a:p>
           <a:p>
             <a:pPr lvl="1"/>
             <a:r>
-              <a:rPr lang="en-US" smtClean="0"/>
+              <a:rPr lang="en-US"/>
               <a:t>Second level</a:t>
             </a:r>
           </a:p>
           <a:p>
             <a:pPr lvl="2"/>
             <a:r>
-              <a:rPr lang="en-US" smtClean="0"/>
+              <a:rPr lang="en-US"/>
               <a:t>Third level</a:t>
             </a:r>
           </a:p>
           <a:p>
             <a:pPr lvl="3"/>
             <a:r>
-              <a:rPr lang="en-US" smtClean="0"/>
+              <a:rPr lang="en-US"/>
               <a:t>Fourth level</a:t>
             </a:r>
           </a:p>
           <a:p>
             <a:pPr lvl="4"/>
             <a:r>
-              <a:rPr lang="en-US" smtClean="0"/>
+              <a:rPr lang="en-US"/>
               <a:t>Fifth level</a:t>
             </a:r>
-            <a:endParaRPr lang="en-US"/>
           </a:p>
         </p:txBody>
       </p:sp>
@@ -466,7 +478,7 @@
           <a:p>
             <a:fld id="{5BCAD085-E8A6-8845-BD4E-CB4CCA059FC4}" type="datetimeFigureOut">
               <a:rPr lang="en-US" smtClean="0"/>
-              <a:t>1/27/13</a:t>
+              <a:t>11/24/2025</a:t>
             </a:fld>
             <a:endParaRPr lang="en-US"/>
           </a:p>
@@ -565,10 +577,9 @@
           <a:lstStyle/>
           <a:p>
             <a:r>
-              <a:rPr lang="en-US" smtClean="0"/>
+              <a:rPr lang="en-US"/>
               <a:t>Click to edit Master title style</a:t>
             </a:r>
-            <a:endParaRPr lang="en-US"/>
           </a:p>
         </p:txBody>
       </p:sp>
@@ -594,38 +605,37 @@
           <a:p>
             <a:pPr lvl="0"/>
             <a:r>
-              <a:rPr lang="en-US" smtClean="0"/>
+              <a:rPr lang="en-US"/>
               <a:t>Click to edit Master text styles</a:t>
             </a:r>
           </a:p>
           <a:p>
             <a:pPr lvl="1"/>
             <a:r>
-              <a:rPr lang="en-US" smtClean="0"/>
+              <a:rPr lang="en-US"/>
               <a:t>Second level</a:t>
             </a:r>
           </a:p>
           <a:p>
             <a:pPr lvl="2"/>
             <a:r>
-              <a:rPr lang="en-US" smtClean="0"/>
+              <a:rPr lang="en-US"/>
               <a:t>Third level</a:t>
             </a:r>
           </a:p>
           <a:p>
             <a:pPr lvl="3"/>
             <a:r>
-              <a:rPr lang="en-US" smtClean="0"/>
+              <a:rPr lang="en-US"/>
               <a:t>Fourth level</a:t>
             </a:r>
           </a:p>
           <a:p>
             <a:pPr lvl="4"/>
             <a:r>
-              <a:rPr lang="en-US" smtClean="0"/>
+              <a:rPr lang="en-US"/>
               <a:t>Fifth level</a:t>
             </a:r>
-            <a:endParaRPr lang="en-US"/>
           </a:p>
         </p:txBody>
       </p:sp>
@@ -646,7 +656,7 @@
           <a:p>
             <a:fld id="{5BCAD085-E8A6-8845-BD4E-CB4CCA059FC4}" type="datetimeFigureOut">
               <a:rPr lang="en-US" smtClean="0"/>
-              <a:t>1/27/13</a:t>
+              <a:t>11/24/2025</a:t>
             </a:fld>
             <a:endParaRPr lang="en-US"/>
           </a:p>
@@ -740,10 +750,9 @@
           <a:lstStyle/>
           <a:p>
             <a:r>
-              <a:rPr lang="en-US" smtClean="0"/>
+              <a:rPr lang="en-US"/>
               <a:t>Click to edit Master title style</a:t>
             </a:r>
-            <a:endParaRPr lang="en-US"/>
           </a:p>
         </p:txBody>
       </p:sp>
@@ -764,38 +773,37 @@
           <a:p>
             <a:pPr lvl="0"/>
             <a:r>
-              <a:rPr lang="en-US" smtClean="0"/>
+              <a:rPr lang="en-US"/>
               <a:t>Click to edit Master text styles</a:t>
             </a:r>
           </a:p>
           <a:p>
             <a:pPr lvl="1"/>
             <a:r>
-              <a:rPr lang="en-US" smtClean="0"/>
+              <a:rPr lang="en-US"/>
               <a:t>Second level</a:t>
             </a:r>
           </a:p>
           <a:p>
             <a:pPr lvl="2"/>
             <a:r>
-              <a:rPr lang="en-US" smtClean="0"/>
+              <a:rPr lang="en-US"/>
               <a:t>Third level</a:t>
             </a:r>
           </a:p>
           <a:p>
             <a:pPr lvl="3"/>
             <a:r>
-              <a:rPr lang="en-US" smtClean="0"/>
+              <a:rPr lang="en-US"/>
               <a:t>Fourth level</a:t>
             </a:r>
           </a:p>
           <a:p>
             <a:pPr lvl="4"/>
             <a:r>
-              <a:rPr lang="en-US" smtClean="0"/>
+              <a:rPr lang="en-US"/>
               <a:t>Fifth level</a:t>
             </a:r>
-            <a:endParaRPr lang="en-US"/>
           </a:p>
         </p:txBody>
       </p:sp>
@@ -816,7 +824,7 @@
           <a:p>
             <a:fld id="{5BCAD085-E8A6-8845-BD4E-CB4CCA059FC4}" type="datetimeFigureOut">
               <a:rPr lang="en-US" smtClean="0"/>
-              <a:t>1/27/13</a:t>
+              <a:t>11/24/2025</a:t>
             </a:fld>
             <a:endParaRPr lang="en-US"/>
           </a:p>
@@ -919,10 +927,9 @@
           </a:lstStyle>
           <a:p>
             <a:r>
-              <a:rPr lang="en-US" smtClean="0"/>
+              <a:rPr lang="en-US"/>
               <a:t>Click to edit Master title style</a:t>
             </a:r>
-            <a:endParaRPr lang="en-US"/>
           </a:p>
         </p:txBody>
       </p:sp>
@@ -1039,7 +1046,7 @@
           <a:p>
             <a:pPr lvl="0"/>
             <a:r>
-              <a:rPr lang="en-US" smtClean="0"/>
+              <a:rPr lang="en-US"/>
               <a:t>Click to edit Master text styles</a:t>
             </a:r>
           </a:p>
@@ -1062,7 +1069,7 @@
           <a:p>
             <a:fld id="{5BCAD085-E8A6-8845-BD4E-CB4CCA059FC4}" type="datetimeFigureOut">
               <a:rPr lang="en-US" smtClean="0"/>
-              <a:t>1/27/13</a:t>
+              <a:t>11/24/2025</a:t>
             </a:fld>
             <a:endParaRPr lang="en-US"/>
           </a:p>
@@ -1156,10 +1163,9 @@
           <a:lstStyle/>
           <a:p>
             <a:r>
-              <a:rPr lang="en-US" smtClean="0"/>
+              <a:rPr lang="en-US"/>
               <a:t>Click to edit Master title style</a:t>
             </a:r>
-            <a:endParaRPr lang="en-US"/>
           </a:p>
         </p:txBody>
       </p:sp>
@@ -1213,38 +1219,37 @@
           <a:p>
             <a:pPr lvl="0"/>
             <a:r>
-              <a:rPr lang="en-US" smtClean="0"/>
+              <a:rPr lang="en-US"/>
               <a:t>Click to edit Master text styles</a:t>
             </a:r>
           </a:p>
           <a:p>
             <a:pPr lvl="1"/>
             <a:r>
-              <a:rPr lang="en-US" smtClean="0"/>
+              <a:rPr lang="en-US"/>
               <a:t>Second level</a:t>
             </a:r>
           </a:p>
           <a:p>
             <a:pPr lvl="2"/>
             <a:r>
-              <a:rPr lang="en-US" smtClean="0"/>
+              <a:rPr lang="en-US"/>
               <a:t>Third level</a:t>
             </a:r>
           </a:p>
           <a:p>
             <a:pPr lvl="3"/>
             <a:r>
-              <a:rPr lang="en-US" smtClean="0"/>
+              <a:rPr lang="en-US"/>
               <a:t>Fourth level</a:t>
             </a:r>
           </a:p>
           <a:p>
             <a:pPr lvl="4"/>
             <a:r>
-              <a:rPr lang="en-US" smtClean="0"/>
+              <a:rPr lang="en-US"/>
               <a:t>Fifth level</a:t>
             </a:r>
-            <a:endParaRPr lang="en-US"/>
           </a:p>
         </p:txBody>
       </p:sp>
@@ -1298,38 +1303,37 @@
           <a:p>
             <a:pPr lvl="0"/>
             <a:r>
-              <a:rPr lang="en-US" smtClean="0"/>
+              <a:rPr lang="en-US"/>
               <a:t>Click to edit Master text styles</a:t>
             </a:r>
           </a:p>
           <a:p>
             <a:pPr lvl="1"/>
             <a:r>
-              <a:rPr lang="en-US" smtClean="0"/>
+              <a:rPr lang="en-US"/>
               <a:t>Second level</a:t>
             </a:r>
           </a:p>
           <a:p>
             <a:pPr lvl="2"/>
             <a:r>
-              <a:rPr lang="en-US" smtClean="0"/>
+              <a:rPr lang="en-US"/>
               <a:t>Third level</a:t>
             </a:r>
           </a:p>
           <a:p>
             <a:pPr lvl="3"/>
             <a:r>
-              <a:rPr lang="en-US" smtClean="0"/>
+              <a:rPr lang="en-US"/>
               <a:t>Fourth level</a:t>
             </a:r>
           </a:p>
           <a:p>
             <a:pPr lvl="4"/>
             <a:r>
-              <a:rPr lang="en-US" smtClean="0"/>
+              <a:rPr lang="en-US"/>
               <a:t>Fifth level</a:t>
             </a:r>
-            <a:endParaRPr lang="en-US"/>
           </a:p>
         </p:txBody>
       </p:sp>
@@ -1350,7 +1354,7 @@
           <a:p>
             <a:fld id="{5BCAD085-E8A6-8845-BD4E-CB4CCA059FC4}" type="datetimeFigureOut">
               <a:rPr lang="en-US" smtClean="0"/>
-              <a:t>1/27/13</a:t>
+              <a:t>11/24/2025</a:t>
             </a:fld>
             <a:endParaRPr lang="en-US"/>
           </a:p>
@@ -1448,10 +1452,9 @@
           </a:lstStyle>
           <a:p>
             <a:r>
-              <a:rPr lang="en-US" smtClean="0"/>
+              <a:rPr lang="en-US"/>
               <a:t>Click to edit Master title style</a:t>
             </a:r>
-            <a:endParaRPr lang="en-US"/>
           </a:p>
         </p:txBody>
       </p:sp>
@@ -1514,7 +1517,7 @@
           <a:p>
             <a:pPr lvl="0"/>
             <a:r>
-              <a:rPr lang="en-US" smtClean="0"/>
+              <a:rPr lang="en-US"/>
               <a:t>Click to edit Master text styles</a:t>
             </a:r>
           </a:p>
@@ -1570,38 +1573,37 @@
           <a:p>
             <a:pPr lvl="0"/>
             <a:r>
-              <a:rPr lang="en-US" smtClean="0"/>
+              <a:rPr lang="en-US"/>
               <a:t>Click to edit Master text styles</a:t>
             </a:r>
           </a:p>
           <a:p>
             <a:pPr lvl="1"/>
             <a:r>
-              <a:rPr lang="en-US" smtClean="0"/>
+              <a:rPr lang="en-US"/>
               <a:t>Second level</a:t>
             </a:r>
           </a:p>
           <a:p>
             <a:pPr lvl="2"/>
             <a:r>
-              <a:rPr lang="en-US" smtClean="0"/>
+              <a:rPr lang="en-US"/>
               <a:t>Third level</a:t>
             </a:r>
           </a:p>
           <a:p>
             <a:pPr lvl="3"/>
             <a:r>
-              <a:rPr lang="en-US" smtClean="0"/>
+              <a:rPr lang="en-US"/>
               <a:t>Fourth level</a:t>
             </a:r>
           </a:p>
           <a:p>
             <a:pPr lvl="4"/>
             <a:r>
-              <a:rPr lang="en-US" smtClean="0"/>
+              <a:rPr lang="en-US"/>
               <a:t>Fifth level</a:t>
             </a:r>
-            <a:endParaRPr lang="en-US"/>
           </a:p>
         </p:txBody>
       </p:sp>
@@ -1664,7 +1666,7 @@
           <a:p>
             <a:pPr lvl="0"/>
             <a:r>
-              <a:rPr lang="en-US" smtClean="0"/>
+              <a:rPr lang="en-US"/>
               <a:t>Click to edit Master text styles</a:t>
             </a:r>
           </a:p>
@@ -1720,38 +1722,37 @@
           <a:p>
             <a:pPr lvl="0"/>
             <a:r>
-              <a:rPr lang="en-US" smtClean="0"/>
+              <a:rPr lang="en-US"/>
               <a:t>Click to edit Master text styles</a:t>
             </a:r>
           </a:p>
           <a:p>
             <a:pPr lvl="1"/>
             <a:r>
-              <a:rPr lang="en-US" smtClean="0"/>
+              <a:rPr lang="en-US"/>
               <a:t>Second level</a:t>
             </a:r>
           </a:p>
           <a:p>
             <a:pPr lvl="2"/>
             <a:r>
-              <a:rPr lang="en-US" smtClean="0"/>
+              <a:rPr lang="en-US"/>
               <a:t>Third level</a:t>
             </a:r>
           </a:p>
           <a:p>
             <a:pPr lvl="3"/>
             <a:r>
-              <a:rPr lang="en-US" smtClean="0"/>
+              <a:rPr lang="en-US"/>
               <a:t>Fourth level</a:t>
             </a:r>
           </a:p>
           <a:p>
             <a:pPr lvl="4"/>
             <a:r>
-              <a:rPr lang="en-US" smtClean="0"/>
+              <a:rPr lang="en-US"/>
               <a:t>Fifth level</a:t>
             </a:r>
-            <a:endParaRPr lang="en-US"/>
           </a:p>
         </p:txBody>
       </p:sp>
@@ -1772,7 +1773,7 @@
           <a:p>
             <a:fld id="{5BCAD085-E8A6-8845-BD4E-CB4CCA059FC4}" type="datetimeFigureOut">
               <a:rPr lang="en-US" smtClean="0"/>
-              <a:t>1/27/13</a:t>
+              <a:t>11/24/2025</a:t>
             </a:fld>
             <a:endParaRPr lang="en-US"/>
           </a:p>
@@ -1866,10 +1867,9 @@
           <a:lstStyle/>
           <a:p>
             <a:r>
-              <a:rPr lang="en-US" smtClean="0"/>
+              <a:rPr lang="en-US"/>
               <a:t>Click to edit Master title style</a:t>
             </a:r>
-            <a:endParaRPr lang="en-US"/>
           </a:p>
         </p:txBody>
       </p:sp>
@@ -1890,7 +1890,7 @@
           <a:p>
             <a:fld id="{5BCAD085-E8A6-8845-BD4E-CB4CCA059FC4}" type="datetimeFigureOut">
               <a:rPr lang="en-US" smtClean="0"/>
-              <a:t>1/27/13</a:t>
+              <a:t>11/24/2025</a:t>
             </a:fld>
             <a:endParaRPr lang="en-US"/>
           </a:p>
@@ -1985,7 +1985,7 @@
           <a:p>
             <a:fld id="{5BCAD085-E8A6-8845-BD4E-CB4CCA059FC4}" type="datetimeFigureOut">
               <a:rPr lang="en-US" smtClean="0"/>
-              <a:t>1/27/13</a:t>
+              <a:t>11/24/2025</a:t>
             </a:fld>
             <a:endParaRPr lang="en-US"/>
           </a:p>
@@ -2088,10 +2088,9 @@
           </a:lstStyle>
           <a:p>
             <a:r>
-              <a:rPr lang="en-US" smtClean="0"/>
+              <a:rPr lang="en-US"/>
               <a:t>Click to edit Master title style</a:t>
             </a:r>
-            <a:endParaRPr lang="en-US"/>
           </a:p>
         </p:txBody>
       </p:sp>
@@ -2145,38 +2144,37 @@
           <a:p>
             <a:pPr lvl="0"/>
             <a:r>
-              <a:rPr lang="en-US" smtClean="0"/>
+              <a:rPr lang="en-US"/>
               <a:t>Click to edit Master text styles</a:t>
             </a:r>
           </a:p>
           <a:p>
             <a:pPr lvl="1"/>
             <a:r>
-              <a:rPr lang="en-US" smtClean="0"/>
+              <a:rPr lang="en-US"/>
               <a:t>Second level</a:t>
             </a:r>
           </a:p>
           <a:p>
             <a:pPr lvl="2"/>
             <a:r>
-              <a:rPr lang="en-US" smtClean="0"/>
+              <a:rPr lang="en-US"/>
               <a:t>Third level</a:t>
             </a:r>
           </a:p>
           <a:p>
             <a:pPr lvl="3"/>
             <a:r>
-              <a:rPr lang="en-US" smtClean="0"/>
+              <a:rPr lang="en-US"/>
               <a:t>Fourth level</a:t>
             </a:r>
           </a:p>
           <a:p>
             <a:pPr lvl="4"/>
             <a:r>
-              <a:rPr lang="en-US" smtClean="0"/>
+              <a:rPr lang="en-US"/>
               <a:t>Fifth level</a:t>
             </a:r>
-            <a:endParaRPr lang="en-US"/>
           </a:p>
         </p:txBody>
       </p:sp>
@@ -2239,7 +2237,7 @@
           <a:p>
             <a:pPr lvl="0"/>
             <a:r>
-              <a:rPr lang="en-US" smtClean="0"/>
+              <a:rPr lang="en-US"/>
               <a:t>Click to edit Master text styles</a:t>
             </a:r>
           </a:p>
@@ -2262,7 +2260,7 @@
           <a:p>
             <a:fld id="{5BCAD085-E8A6-8845-BD4E-CB4CCA059FC4}" type="datetimeFigureOut">
               <a:rPr lang="en-US" smtClean="0"/>
-              <a:t>1/27/13</a:t>
+              <a:t>11/24/2025</a:t>
             </a:fld>
             <a:endParaRPr lang="en-US"/>
           </a:p>
@@ -2365,10 +2363,9 @@
           </a:lstStyle>
           <a:p>
             <a:r>
-              <a:rPr lang="en-US" smtClean="0"/>
+              <a:rPr lang="en-US"/>
               <a:t>Click to edit Master title style</a:t>
             </a:r>
-            <a:endParaRPr lang="en-US"/>
           </a:p>
         </p:txBody>
       </p:sp>
@@ -2492,7 +2489,7 @@
           <a:p>
             <a:pPr lvl="0"/>
             <a:r>
-              <a:rPr lang="en-US" smtClean="0"/>
+              <a:rPr lang="en-US"/>
               <a:t>Click to edit Master text styles</a:t>
             </a:r>
           </a:p>
@@ -2515,7 +2512,7 @@
           <a:p>
             <a:fld id="{5BCAD085-E8A6-8845-BD4E-CB4CCA059FC4}" type="datetimeFigureOut">
               <a:rPr lang="en-US" smtClean="0"/>
-              <a:t>1/27/13</a:t>
+              <a:t>11/24/2025</a:t>
             </a:fld>
             <a:endParaRPr lang="en-US"/>
           </a:p>
@@ -2624,10 +2621,9 @@
           <a:lstStyle/>
           <a:p>
             <a:r>
-              <a:rPr lang="en-US" smtClean="0"/>
+              <a:rPr lang="en-US"/>
               <a:t>Click to edit Master title style</a:t>
             </a:r>
-            <a:endParaRPr lang="en-US"/>
           </a:p>
         </p:txBody>
       </p:sp>
@@ -2658,38 +2654,37 @@
           <a:p>
             <a:pPr lvl="0"/>
             <a:r>
-              <a:rPr lang="en-US" smtClean="0"/>
+              <a:rPr lang="en-US"/>
               <a:t>Click to edit Master text styles</a:t>
             </a:r>
           </a:p>
           <a:p>
             <a:pPr lvl="1"/>
             <a:r>
-              <a:rPr lang="en-US" smtClean="0"/>
+              <a:rPr lang="en-US"/>
               <a:t>Second level</a:t>
             </a:r>
           </a:p>
           <a:p>
             <a:pPr lvl="2"/>
             <a:r>
-              <a:rPr lang="en-US" smtClean="0"/>
+              <a:rPr lang="en-US"/>
               <a:t>Third level</a:t>
             </a:r>
           </a:p>
           <a:p>
             <a:pPr lvl="3"/>
             <a:r>
-              <a:rPr lang="en-US" smtClean="0"/>
+              <a:rPr lang="en-US"/>
               <a:t>Fourth level</a:t>
             </a:r>
           </a:p>
           <a:p>
             <a:pPr lvl="4"/>
             <a:r>
-              <a:rPr lang="en-US" smtClean="0"/>
+              <a:rPr lang="en-US"/>
               <a:t>Fifth level</a:t>
             </a:r>
-            <a:endParaRPr lang="en-US"/>
           </a:p>
         </p:txBody>
       </p:sp>
@@ -2728,7 +2723,7 @@
           <a:p>
             <a:fld id="{5BCAD085-E8A6-8845-BD4E-CB4CCA059FC4}" type="datetimeFigureOut">
               <a:rPr lang="en-US" smtClean="0"/>
-              <a:t>1/27/13</a:t>
+              <a:t>11/24/2025</a:t>
             </a:fld>
             <a:endParaRPr lang="en-US"/>
           </a:p>
@@ -3087,7 +3082,7 @@
 </file>
 
 <file path=ppt/slides/slide1.xml><?xml version="1.0" encoding="utf-8"?>
-<p:sld xmlns:a="http://schemas.openxmlformats.org/drawingml/2006/main" xmlns:p="http://schemas.openxmlformats.org/presentationml/2006/main" xmlns:r="http://schemas.openxmlformats.org/officeDocument/2006/relationships">
+<p:sld xmlns:a="http://schemas.openxmlformats.org/drawingml/2006/main" xmlns:r="http://schemas.openxmlformats.org/officeDocument/2006/relationships" xmlns:p="http://schemas.openxmlformats.org/presentationml/2006/main">
   <p:cSld>
     <p:spTree>
       <p:nvGrpSpPr>
@@ -3095,7 +3090,14 @@
         <p:cNvGrpSpPr/>
         <p:nvPr/>
       </p:nvGrpSpPr>
-      <p:grpSpPr/>
+      <p:grpSpPr>
+        <a:xfrm>
+          <a:off x="0" y="0"/>
+          <a:ext cx="0" cy="0"/>
+          <a:chOff x="0" y="0"/>
+          <a:chExt cx="0" cy="0"/>
+        </a:xfrm>
+      </p:grpSpPr>
       <p:sp>
         <p:nvSpPr>
           <p:cNvPr id="2" name="TextBox 1"/>
@@ -3119,7 +3121,7 @@
           <a:lstStyle/>
           <a:p>
             <a:pPr>
-              <a:defRPr b="1" sz="2400"/>
+              <a:defRPr sz="2400" b="1"/>
             </a:pPr>
             <a:r>
               <a:t>Chiral vortex interlocking in topological soliton lattice</a:t>
@@ -3148,7 +3150,9 @@
             <a:spAutoFit/>
           </a:bodyPr>
           <a:lstStyle/>
-          <a:p/>
+          <a:p>
+            <a:endParaRPr/>
+          </a:p>
           <a:p>
             <a:pPr>
               <a:defRPr sz="1200"/>
@@ -3192,7 +3196,7 @@
 </file>
 
 <file path=ppt/slides/slide2.xml><?xml version="1.0" encoding="utf-8"?>
-<p:sld xmlns:a="http://schemas.openxmlformats.org/drawingml/2006/main" xmlns:p="http://schemas.openxmlformats.org/presentationml/2006/main" xmlns:r="http://schemas.openxmlformats.org/officeDocument/2006/relationships">
+<p:sld xmlns:a="http://schemas.openxmlformats.org/drawingml/2006/main" xmlns:r="http://schemas.openxmlformats.org/officeDocument/2006/relationships" xmlns:p="http://schemas.openxmlformats.org/presentationml/2006/main">
   <p:cSld>
     <p:spTree>
       <p:nvGrpSpPr>
@@ -3200,7 +3204,14 @@
         <p:cNvGrpSpPr/>
         <p:nvPr/>
       </p:nvGrpSpPr>
-      <p:grpSpPr/>
+      <p:grpSpPr>
+        <a:xfrm>
+          <a:off x="0" y="0"/>
+          <a:ext cx="0" cy="0"/>
+          <a:chOff x="0" y="0"/>
+          <a:chExt cx="0" cy="0"/>
+        </a:xfrm>
+      </p:grpSpPr>
       <p:pic>
         <p:nvPicPr>
           <p:cNvPr id="2" name="Picture 1" descr="data_fig_1_0.png"/>
@@ -3248,7 +3259,7 @@
           <a:lstStyle/>
           <a:p>
             <a:pPr>
-              <a:defRPr b="1" sz="1400"/>
+              <a:defRPr sz="1400" b="1"/>
             </a:pPr>
             <a:r>
               <a:t>Figure 1: 3x3 Charge Density Wave (CDW) in 2H-TaSe2</a:t>
@@ -3256,7 +3267,7 @@
           </a:p>
           <a:p>
             <a:pPr>
-              <a:defRPr b="1" sz="1100"/>
+              <a:defRPr sz="1100" b="1"/>
             </a:pPr>
             <a:r>
               <a:t>Info:</a:t>
@@ -3282,7 +3293,7 @@
           </a:p>
           <a:p>
             <a:pPr>
-              <a:defRPr b="1" sz="1100"/>
+              <a:defRPr sz="1100" b="1"/>
             </a:pPr>
             <a:r>
               <a:t>Argument:</a:t>
@@ -3317,7 +3328,7 @@
 </file>
 
 <file path=ppt/slides/slide3.xml><?xml version="1.0" encoding="utf-8"?>
-<p:sld xmlns:a="http://schemas.openxmlformats.org/drawingml/2006/main" xmlns:p="http://schemas.openxmlformats.org/presentationml/2006/main" xmlns:r="http://schemas.openxmlformats.org/officeDocument/2006/relationships">
+<p:sld xmlns:a="http://schemas.openxmlformats.org/drawingml/2006/main" xmlns:r="http://schemas.openxmlformats.org/officeDocument/2006/relationships" xmlns:p="http://schemas.openxmlformats.org/presentationml/2006/main">
   <p:cSld>
     <p:spTree>
       <p:nvGrpSpPr>
@@ -3325,7 +3336,14 @@
         <p:cNvGrpSpPr/>
         <p:nvPr/>
       </p:nvGrpSpPr>
-      <p:grpSpPr/>
+      <p:grpSpPr>
+        <a:xfrm>
+          <a:off x="0" y="0"/>
+          <a:ext cx="0" cy="0"/>
+          <a:chOff x="0" y="0"/>
+          <a:chExt cx="0" cy="0"/>
+        </a:xfrm>
+      </p:grpSpPr>
       <p:pic>
         <p:nvPicPr>
           <p:cNvPr id="2" name="Picture 1" descr="data_fig_1_1.png"/>
@@ -3373,7 +3391,7 @@
           <a:lstStyle/>
           <a:p>
             <a:pPr>
-              <a:defRPr b="1" sz="1400"/>
+              <a:defRPr sz="1400" b="1"/>
             </a:pPr>
             <a:r>
               <a:t>Figure 1: 3x3 Charge Density Wave (CDW) in 2H-TaSe2</a:t>
@@ -3381,7 +3399,7 @@
           </a:p>
           <a:p>
             <a:pPr>
-              <a:defRPr b="1" sz="1100"/>
+              <a:defRPr sz="1100" b="1"/>
             </a:pPr>
             <a:r>
               <a:t>Info:</a:t>
@@ -3407,7 +3425,7 @@
           </a:p>
           <a:p>
             <a:pPr>
-              <a:defRPr b="1" sz="1100"/>
+              <a:defRPr sz="1100" b="1"/>
             </a:pPr>
             <a:r>
               <a:t>Argument:</a:t>
@@ -3442,7 +3460,7 @@
 </file>
 
 <file path=ppt/slides/slide4.xml><?xml version="1.0" encoding="utf-8"?>
-<p:sld xmlns:a="http://schemas.openxmlformats.org/drawingml/2006/main" xmlns:p="http://schemas.openxmlformats.org/presentationml/2006/main" xmlns:r="http://schemas.openxmlformats.org/officeDocument/2006/relationships">
+<p:sld xmlns:a="http://schemas.openxmlformats.org/drawingml/2006/main" xmlns:r="http://schemas.openxmlformats.org/officeDocument/2006/relationships" xmlns:p="http://schemas.openxmlformats.org/presentationml/2006/main">
   <p:cSld>
     <p:spTree>
       <p:nvGrpSpPr>
@@ -3450,7 +3468,14 @@
         <p:cNvGrpSpPr/>
         <p:nvPr/>
       </p:nvGrpSpPr>
-      <p:grpSpPr/>
+      <p:grpSpPr>
+        <a:xfrm>
+          <a:off x="0" y="0"/>
+          <a:ext cx="0" cy="0"/>
+          <a:chOff x="0" y="0"/>
+          <a:chExt cx="0" cy="0"/>
+        </a:xfrm>
+      </p:grpSpPr>
       <p:pic>
         <p:nvPicPr>
           <p:cNvPr id="2" name="Picture 1" descr="data_fig_2_0.png"/>
@@ -3498,7 +3523,7 @@
           <a:lstStyle/>
           <a:p>
             <a:pPr>
-              <a:defRPr b="1" sz="1400"/>
+              <a:defRPr sz="1400" b="1"/>
             </a:pPr>
             <a:r>
               <a:t>Figure 2: 3 types of topological domain walls (DW)</a:t>
@@ -3506,7 +3531,7 @@
           </a:p>
           <a:p>
             <a:pPr>
-              <a:defRPr b="1" sz="1100"/>
+              <a:defRPr sz="1100" b="1"/>
             </a:pPr>
             <a:r>
               <a:t>Info:</a:t>
@@ -3532,7 +3557,7 @@
           </a:p>
           <a:p>
             <a:pPr>
-              <a:defRPr b="1" sz="1100"/>
+              <a:defRPr sz="1100" b="1"/>
             </a:pPr>
             <a:r>
               <a:t>Argument:</a:t>
@@ -3567,7 +3592,7 @@
 </file>
 
 <file path=ppt/slides/slide5.xml><?xml version="1.0" encoding="utf-8"?>
-<p:sld xmlns:a="http://schemas.openxmlformats.org/drawingml/2006/main" xmlns:p="http://schemas.openxmlformats.org/presentationml/2006/main" xmlns:r="http://schemas.openxmlformats.org/officeDocument/2006/relationships">
+<p:sld xmlns:a="http://schemas.openxmlformats.org/drawingml/2006/main" xmlns:r="http://schemas.openxmlformats.org/officeDocument/2006/relationships" xmlns:p="http://schemas.openxmlformats.org/presentationml/2006/main">
   <p:cSld>
     <p:spTree>
       <p:nvGrpSpPr>
@@ -3575,7 +3600,14 @@
         <p:cNvGrpSpPr/>
         <p:nvPr/>
       </p:nvGrpSpPr>
-      <p:grpSpPr/>
+      <p:grpSpPr>
+        <a:xfrm>
+          <a:off x="0" y="0"/>
+          <a:ext cx="0" cy="0"/>
+          <a:chOff x="0" y="0"/>
+          <a:chExt cx="0" cy="0"/>
+        </a:xfrm>
+      </p:grpSpPr>
       <p:pic>
         <p:nvPicPr>
           <p:cNvPr id="2" name="Picture 1" descr="data_fig_2_1.png"/>
@@ -3623,7 +3655,7 @@
           <a:lstStyle/>
           <a:p>
             <a:pPr>
-              <a:defRPr b="1" sz="1400"/>
+              <a:defRPr sz="1400" b="1"/>
             </a:pPr>
             <a:r>
               <a:t>Figure 2: 3 types of topological domain walls (DW)</a:t>
@@ -3631,7 +3663,7 @@
           </a:p>
           <a:p>
             <a:pPr>
-              <a:defRPr b="1" sz="1100"/>
+              <a:defRPr sz="1100" b="1"/>
             </a:pPr>
             <a:r>
               <a:t>Info:</a:t>
@@ -3657,7 +3689,7 @@
           </a:p>
           <a:p>
             <a:pPr>
-              <a:defRPr b="1" sz="1100"/>
+              <a:defRPr sz="1100" b="1"/>
             </a:pPr>
             <a:r>
               <a:t>Argument:</a:t>
@@ -3692,7 +3724,7 @@
 </file>
 
 <file path=ppt/slides/slide6.xml><?xml version="1.0" encoding="utf-8"?>
-<p:sld xmlns:a="http://schemas.openxmlformats.org/drawingml/2006/main" xmlns:p="http://schemas.openxmlformats.org/presentationml/2006/main" xmlns:r="http://schemas.openxmlformats.org/officeDocument/2006/relationships">
+<p:sld xmlns:a="http://schemas.openxmlformats.org/drawingml/2006/main" xmlns:r="http://schemas.openxmlformats.org/officeDocument/2006/relationships" xmlns:p="http://schemas.openxmlformats.org/presentationml/2006/main">
   <p:cSld>
     <p:spTree>
       <p:nvGrpSpPr>
@@ -3700,7 +3732,14 @@
         <p:cNvGrpSpPr/>
         <p:nvPr/>
       </p:nvGrpSpPr>
-      <p:grpSpPr/>
+      <p:grpSpPr>
+        <a:xfrm>
+          <a:off x="0" y="0"/>
+          <a:ext cx="0" cy="0"/>
+          <a:chOff x="0" y="0"/>
+          <a:chExt cx="0" cy="0"/>
+        </a:xfrm>
+      </p:grpSpPr>
       <p:pic>
         <p:nvPicPr>
           <p:cNvPr id="2" name="Picture 1" descr="data_fig_3_0.png"/>
@@ -3748,7 +3787,7 @@
           <a:lstStyle/>
           <a:p>
             <a:pPr>
-              <a:defRPr b="1" sz="1400"/>
+              <a:defRPr sz="1400" b="1"/>
             </a:pPr>
             <a:r>
               <a:t>Figure 3: two types of chiral vortices (R and L)</a:t>
@@ -3756,7 +3795,7 @@
           </a:p>
           <a:p>
             <a:pPr>
-              <a:defRPr b="1" sz="1100"/>
+              <a:defRPr sz="1100" b="1"/>
             </a:pPr>
             <a:r>
               <a:t>Info:</a:t>
@@ -3782,7 +3821,7 @@
           </a:p>
           <a:p>
             <a:pPr>
-              <a:defRPr b="1" sz="1100"/>
+              <a:defRPr sz="1100" b="1"/>
             </a:pPr>
             <a:r>
               <a:t>Argument:</a:t>
@@ -3817,7 +3856,7 @@
 </file>
 
 <file path=ppt/slides/slide7.xml><?xml version="1.0" encoding="utf-8"?>
-<p:sld xmlns:a="http://schemas.openxmlformats.org/drawingml/2006/main" xmlns:p="http://schemas.openxmlformats.org/presentationml/2006/main" xmlns:r="http://schemas.openxmlformats.org/officeDocument/2006/relationships">
+<p:sld xmlns:a="http://schemas.openxmlformats.org/drawingml/2006/main" xmlns:r="http://schemas.openxmlformats.org/officeDocument/2006/relationships" xmlns:p="http://schemas.openxmlformats.org/presentationml/2006/main">
   <p:cSld>
     <p:spTree>
       <p:nvGrpSpPr>
@@ -3825,7 +3864,14 @@
         <p:cNvGrpSpPr/>
         <p:nvPr/>
       </p:nvGrpSpPr>
-      <p:grpSpPr/>
+      <p:grpSpPr>
+        <a:xfrm>
+          <a:off x="0" y="0"/>
+          <a:ext cx="0" cy="0"/>
+          <a:chOff x="0" y="0"/>
+          <a:chExt cx="0" cy="0"/>
+        </a:xfrm>
+      </p:grpSpPr>
       <p:pic>
         <p:nvPicPr>
           <p:cNvPr id="2" name="Picture 1" descr="data_fig_3_1.png"/>
@@ -3873,7 +3919,7 @@
           <a:lstStyle/>
           <a:p>
             <a:pPr>
-              <a:defRPr b="1" sz="1400"/>
+              <a:defRPr sz="1400" b="1"/>
             </a:pPr>
             <a:r>
               <a:t>Figure 3: two types of chiral vortices (R and L)</a:t>
@@ -3881,7 +3927,7 @@
           </a:p>
           <a:p>
             <a:pPr>
-              <a:defRPr b="1" sz="1100"/>
+              <a:defRPr sz="1100" b="1"/>
             </a:pPr>
             <a:r>
               <a:t>Info:</a:t>
@@ -3907,7 +3953,7 @@
           </a:p>
           <a:p>
             <a:pPr>
-              <a:defRPr b="1" sz="1100"/>
+              <a:defRPr sz="1100" b="1"/>
             </a:pPr>
             <a:r>
               <a:t>Argument:</a:t>
@@ -3942,7 +3988,7 @@
 </file>
 
 <file path=ppt/slides/slide8.xml><?xml version="1.0" encoding="utf-8"?>
-<p:sld xmlns:a="http://schemas.openxmlformats.org/drawingml/2006/main" xmlns:p="http://schemas.openxmlformats.org/presentationml/2006/main" xmlns:r="http://schemas.openxmlformats.org/officeDocument/2006/relationships">
+<p:sld xmlns:a="http://schemas.openxmlformats.org/drawingml/2006/main" xmlns:r="http://schemas.openxmlformats.org/officeDocument/2006/relationships" xmlns:p="http://schemas.openxmlformats.org/presentationml/2006/main">
   <p:cSld>
     <p:spTree>
       <p:nvGrpSpPr>
@@ -3950,7 +3996,14 @@
         <p:cNvGrpSpPr/>
         <p:nvPr/>
       </p:nvGrpSpPr>
-      <p:grpSpPr/>
+      <p:grpSpPr>
+        <a:xfrm>
+          <a:off x="0" y="0"/>
+          <a:ext cx="0" cy="0"/>
+          <a:chOff x="0" y="0"/>
+          <a:chExt cx="0" cy="0"/>
+        </a:xfrm>
+      </p:grpSpPr>
       <p:pic>
         <p:nvPicPr>
           <p:cNvPr id="2" name="Picture 1" descr="data_fig_4_0.png"/>
@@ -3998,7 +4051,7 @@
           <a:lstStyle/>
           <a:p>
             <a:pPr>
-              <a:defRPr b="1" sz="1400"/>
+              <a:defRPr sz="1400" b="1"/>
             </a:pPr>
             <a:r>
               <a:t>Figure 4: Phase Pinning at the Domain Walls</a:t>
@@ -4006,7 +4059,7 @@
           </a:p>
           <a:p>
             <a:pPr>
-              <a:defRPr b="1" sz="1100"/>
+              <a:defRPr sz="1100" b="1"/>
             </a:pPr>
             <a:r>
               <a:t>Info:</a:t>
@@ -4032,7 +4085,7 @@
           </a:p>
           <a:p>
             <a:pPr>
-              <a:defRPr b="1" sz="1100"/>
+              <a:defRPr sz="1100" b="1"/>
             </a:pPr>
             <a:r>
               <a:t>Argument:</a:t>
@@ -4067,7 +4120,7 @@
 </file>
 
 <file path=ppt/slides/slide9.xml><?xml version="1.0" encoding="utf-8"?>
-<p:sld xmlns:a="http://schemas.openxmlformats.org/drawingml/2006/main" xmlns:p="http://schemas.openxmlformats.org/presentationml/2006/main" xmlns:r="http://schemas.openxmlformats.org/officeDocument/2006/relationships">
+<p:sld xmlns:a="http://schemas.openxmlformats.org/drawingml/2006/main" xmlns:r="http://schemas.openxmlformats.org/officeDocument/2006/relationships" xmlns:p="http://schemas.openxmlformats.org/presentationml/2006/main">
   <p:cSld>
     <p:spTree>
       <p:nvGrpSpPr>
@@ -4075,7 +4128,14 @@
         <p:cNvGrpSpPr/>
         <p:nvPr/>
       </p:nvGrpSpPr>
-      <p:grpSpPr/>
+      <p:grpSpPr>
+        <a:xfrm>
+          <a:off x="0" y="0"/>
+          <a:ext cx="0" cy="0"/>
+          <a:chOff x="0" y="0"/>
+          <a:chExt cx="0" cy="0"/>
+        </a:xfrm>
+      </p:grpSpPr>
       <p:pic>
         <p:nvPicPr>
           <p:cNvPr id="2" name="Picture 1" descr="data_fig_4_0.png"/>
@@ -4123,7 +4183,7 @@
           <a:lstStyle/>
           <a:p>
             <a:pPr>
-              <a:defRPr b="1" sz="1400"/>
+              <a:defRPr sz="1400" b="1"/>
             </a:pPr>
             <a:r>
               <a:t>Figure 4: Phase Pinning at the Domain Walls</a:t>
@@ -4131,7 +4191,7 @@
           </a:p>
           <a:p>
             <a:pPr>
-              <a:defRPr b="1" sz="1100"/>
+              <a:defRPr sz="1100" b="1"/>
             </a:pPr>
             <a:r>
               <a:t>Info:</a:t>
@@ -4157,7 +4217,7 @@
           </a:p>
           <a:p>
             <a:pPr>
-              <a:defRPr b="1" sz="1100"/>
+              <a:defRPr sz="1100" b="1"/>
             </a:pPr>
             <a:r>
               <a:t>Argument:</a:t>

</xml_diff>